<commit_message>
Made changes in pdf and ppt file
</commit_message>
<xml_diff>
--- a/Revenue Stats.pptx
+++ b/Revenue Stats.pptx
@@ -208,7 +208,7 @@
           <a:p>
             <a:fld id="{49E67A9F-44D0-45B0-822C-684FFF8E8599}" type="datetimeFigureOut">
               <a:rPr lang="en-US" smtClean="0"/>
-              <a:t>10/10/2024</a:t>
+              <a:t>10/14/2024</a:t>
             </a:fld>
             <a:endParaRPr lang="en-US"/>
           </a:p>
@@ -706,7 +706,7 @@
           <a:p>
             <a:fld id="{7F02B5A1-8FDC-4173-A1A5-5B280E2EE9DD}" type="datetimeFigureOut">
               <a:rPr lang="en-US" smtClean="0"/>
-              <a:t>10/10/2024</a:t>
+              <a:t>10/14/2024</a:t>
             </a:fld>
             <a:endParaRPr lang="en-US"/>
           </a:p>
@@ -904,7 +904,7 @@
           <a:p>
             <a:fld id="{7F02B5A1-8FDC-4173-A1A5-5B280E2EE9DD}" type="datetimeFigureOut">
               <a:rPr lang="en-US" smtClean="0"/>
-              <a:t>10/10/2024</a:t>
+              <a:t>10/14/2024</a:t>
             </a:fld>
             <a:endParaRPr lang="en-US"/>
           </a:p>
@@ -1112,7 +1112,7 @@
           <a:p>
             <a:fld id="{7F02B5A1-8FDC-4173-A1A5-5B280E2EE9DD}" type="datetimeFigureOut">
               <a:rPr lang="en-US" smtClean="0"/>
-              <a:t>10/10/2024</a:t>
+              <a:t>10/14/2024</a:t>
             </a:fld>
             <a:endParaRPr lang="en-US"/>
           </a:p>
@@ -1310,7 +1310,7 @@
           <a:p>
             <a:fld id="{7F02B5A1-8FDC-4173-A1A5-5B280E2EE9DD}" type="datetimeFigureOut">
               <a:rPr lang="en-US" smtClean="0"/>
-              <a:t>10/10/2024</a:t>
+              <a:t>10/14/2024</a:t>
             </a:fld>
             <a:endParaRPr lang="en-US"/>
           </a:p>
@@ -1585,7 +1585,7 @@
           <a:p>
             <a:fld id="{7F02B5A1-8FDC-4173-A1A5-5B280E2EE9DD}" type="datetimeFigureOut">
               <a:rPr lang="en-US" smtClean="0"/>
-              <a:t>10/10/2024</a:t>
+              <a:t>10/14/2024</a:t>
             </a:fld>
             <a:endParaRPr lang="en-US"/>
           </a:p>
@@ -1850,7 +1850,7 @@
           <a:p>
             <a:fld id="{7F02B5A1-8FDC-4173-A1A5-5B280E2EE9DD}" type="datetimeFigureOut">
               <a:rPr lang="en-US" smtClean="0"/>
-              <a:t>10/10/2024</a:t>
+              <a:t>10/14/2024</a:t>
             </a:fld>
             <a:endParaRPr lang="en-US"/>
           </a:p>
@@ -2262,7 +2262,7 @@
           <a:p>
             <a:fld id="{7F02B5A1-8FDC-4173-A1A5-5B280E2EE9DD}" type="datetimeFigureOut">
               <a:rPr lang="en-US" smtClean="0"/>
-              <a:t>10/10/2024</a:t>
+              <a:t>10/14/2024</a:t>
             </a:fld>
             <a:endParaRPr lang="en-US"/>
           </a:p>
@@ -2403,7 +2403,7 @@
           <a:p>
             <a:fld id="{7F02B5A1-8FDC-4173-A1A5-5B280E2EE9DD}" type="datetimeFigureOut">
               <a:rPr lang="en-US" smtClean="0"/>
-              <a:t>10/10/2024</a:t>
+              <a:t>10/14/2024</a:t>
             </a:fld>
             <a:endParaRPr lang="en-US"/>
           </a:p>
@@ -2516,7 +2516,7 @@
           <a:p>
             <a:fld id="{7F02B5A1-8FDC-4173-A1A5-5B280E2EE9DD}" type="datetimeFigureOut">
               <a:rPr lang="en-US" smtClean="0"/>
-              <a:t>10/10/2024</a:t>
+              <a:t>10/14/2024</a:t>
             </a:fld>
             <a:endParaRPr lang="en-US"/>
           </a:p>
@@ -2827,7 +2827,7 @@
           <a:p>
             <a:fld id="{7F02B5A1-8FDC-4173-A1A5-5B280E2EE9DD}" type="datetimeFigureOut">
               <a:rPr lang="en-US" smtClean="0"/>
-              <a:t>10/10/2024</a:t>
+              <a:t>10/14/2024</a:t>
             </a:fld>
             <a:endParaRPr lang="en-US"/>
           </a:p>
@@ -3115,7 +3115,7 @@
           <a:p>
             <a:fld id="{7F02B5A1-8FDC-4173-A1A5-5B280E2EE9DD}" type="datetimeFigureOut">
               <a:rPr lang="en-US" smtClean="0"/>
-              <a:t>10/10/2024</a:t>
+              <a:t>10/14/2024</a:t>
             </a:fld>
             <a:endParaRPr lang="en-US"/>
           </a:p>
@@ -3356,7 +3356,7 @@
           <a:p>
             <a:fld id="{7F02B5A1-8FDC-4173-A1A5-5B280E2EE9DD}" type="datetimeFigureOut">
               <a:rPr lang="en-US" smtClean="0"/>
-              <a:t>10/10/2024</a:t>
+              <a:t>10/14/2024</a:t>
             </a:fld>
             <a:endParaRPr lang="en-US"/>
           </a:p>
@@ -4072,6 +4072,41 @@
           <a:lstStyle/>
           <a:p>
             <a:endParaRPr lang="en-US" sz="2000" dirty="0"/>
+          </a:p>
+        </p:txBody>
+      </p:sp>
+      <p:sp>
+        <p:nvSpPr>
+          <p:cNvPr id="2" name="TextBox 1">
+            <a:extLst>
+              <a:ext uri="{FF2B5EF4-FFF2-40B4-BE49-F238E27FC236}">
+                <a16:creationId xmlns:a16="http://schemas.microsoft.com/office/drawing/2014/main" id="{DC0B46BA-8FBB-7746-CA62-955B5574BD99}"/>
+              </a:ext>
+            </a:extLst>
+          </p:cNvPr>
+          <p:cNvSpPr txBox="1"/>
+          <p:nvPr/>
+        </p:nvSpPr>
+        <p:spPr>
+          <a:xfrm>
+            <a:off x="9199418" y="6289964"/>
+            <a:ext cx="2835564" cy="369332"/>
+          </a:xfrm>
+          <a:prstGeom prst="rect">
+            <a:avLst/>
+          </a:prstGeom>
+          <a:noFill/>
+        </p:spPr>
+        <p:txBody>
+          <a:bodyPr wrap="square" rtlCol="0">
+            <a:spAutoFit/>
+          </a:bodyPr>
+          <a:lstStyle/>
+          <a:p>
+            <a:r>
+              <a:rPr lang="en-US" dirty="0"/>
+              <a:t>	- Akshata Agine</a:t>
+            </a:r>
           </a:p>
         </p:txBody>
       </p:sp>

</xml_diff>